<commit_message>
2021.10.9 MIT 6.172 #2 && MIT 6.840 #1
</commit_message>
<xml_diff>
--- a/MIT 6.840/lectures/lecture01/MIT18_404f20_lec1.pptx
+++ b/MIT 6.840/lectures/lecture01/MIT18_404f20_lec1.pptx
@@ -5,7 +5,7 @@
     <p:sldMasterId id="2147483648" r:id="rId4"/>
   </p:sldMasterIdLst>
   <p:notesMasterIdLst>
-    <p:notesMasterId r:id="rId19"/>
+    <p:notesMasterId r:id="rId20"/>
   </p:notesMasterIdLst>
   <p:sldIdLst>
     <p:sldId id="259" r:id="rId5"/>
@@ -19,9 +19,10 @@
     <p:sldId id="271" r:id="rId13"/>
     <p:sldId id="273" r:id="rId14"/>
     <p:sldId id="277" r:id="rId15"/>
-    <p:sldId id="280" r:id="rId16"/>
-    <p:sldId id="281" r:id="rId17"/>
-    <p:sldId id="282" r:id="rId18"/>
+    <p:sldId id="283" r:id="rId16"/>
+    <p:sldId id="280" r:id="rId17"/>
+    <p:sldId id="281" r:id="rId18"/>
+    <p:sldId id="282" r:id="rId19"/>
   </p:sldIdLst>
   <p:sldSz cx="12192000" cy="6858000"/>
   <p:notesSz cx="6858000" cy="9144000"/>
@@ -210,7 +211,7 @@
           <a:p>
             <a:fld id="{0554BE19-BB89-43A8-85E8-06B3C9EBBF22}" type="datetimeFigureOut">
               <a:rPr lang="en-US" smtClean="0"/>
-              <a:t>2/15/21</a:t>
+              <a:t>10/9/21</a:t>
             </a:fld>
             <a:endParaRPr lang="en-US"/>
           </a:p>
@@ -614,7 +615,7 @@
                       <m:jc m:val="centerGroup"/>
                     </m:oMathParaPr>
                     <m:oMath xmlns:m="http://schemas.openxmlformats.org/officeDocument/2006/math">
-                      <a:fld id="{DFB2E2CC-0575-314A-BC7C-41383A5306B7}" type="mathplaceholder">
+                      <a:fld id="{825F15A7-03F4-43D7-82C5-3E23DA2F108C}" type="mathplaceholder">
                         <a:rPr lang="en-US" i="1" smtClean="0">
                           <a:latin typeface="Cambria Math" panose="02040503050406030204" pitchFamily="18" charset="0"/>
                         </a:rPr>
@@ -745,7 +746,7 @@
                       <m:jc m:val="centerGroup"/>
                     </m:oMathParaPr>
                     <m:oMath xmlns:m="http://schemas.openxmlformats.org/officeDocument/2006/math">
-                      <a:fld id="{B600041A-3154-B64E-B181-71ECCBF1C8B9}" type="mathplaceholder">
+                      <a:fld id="{825F15A7-03F4-43D7-82C5-3E23DA2F108C}" type="mathplaceholder">
                         <a:rPr lang="en-US" i="1" smtClean="0">
                           <a:latin typeface="Cambria Math" panose="02040503050406030204" pitchFamily="18" charset="0"/>
                         </a:rPr>
@@ -804,7 +805,7 @@
           <a:p>
             <a:fld id="{2F16D66E-EB54-4813-B230-A061E63C474B}" type="slidenum">
               <a:rPr lang="en-US" smtClean="0"/>
-              <a:t>12</a:t>
+              <a:t>13</a:t>
             </a:fld>
             <a:endParaRPr lang="en-US"/>
           </a:p>
@@ -876,7 +877,7 @@
                       <m:jc m:val="centerGroup"/>
                     </m:oMathParaPr>
                     <m:oMath xmlns:m="http://schemas.openxmlformats.org/officeDocument/2006/math">
-                      <a:fld id="{76BF9025-C181-0C43-B854-BF723E3BA527}" type="mathplaceholder">
+                      <a:fld id="{825F15A7-03F4-43D7-82C5-3E23DA2F108C}" type="mathplaceholder">
                         <a:rPr lang="en-US" i="1" smtClean="0">
                           <a:latin typeface="Cambria Math" panose="02040503050406030204" pitchFamily="18" charset="0"/>
                         </a:rPr>
@@ -935,7 +936,7 @@
           <a:p>
             <a:fld id="{2F16D66E-EB54-4813-B230-A061E63C474B}" type="slidenum">
               <a:rPr lang="en-US" smtClean="0"/>
-              <a:t>13</a:t>
+              <a:t>14</a:t>
             </a:fld>
             <a:endParaRPr lang="en-US"/>
           </a:p>
@@ -1519,7 +1520,7 @@
                       <m:jc m:val="centerGroup"/>
                     </m:oMathParaPr>
                     <m:oMath xmlns:m="http://schemas.openxmlformats.org/officeDocument/2006/math">
-                      <a:fld id="{14F48517-60A9-8447-B97C-714A51CF5971}" type="mathplaceholder">
+                      <a:fld id="{825F15A7-03F4-43D7-82C5-3E23DA2F108C}" type="mathplaceholder">
                         <a:rPr lang="en-US" i="1" smtClean="0">
                           <a:latin typeface="Cambria Math" panose="02040503050406030204" pitchFamily="18" charset="0"/>
                         </a:rPr>
@@ -1650,7 +1651,7 @@
                       <m:jc m:val="centerGroup"/>
                     </m:oMathParaPr>
                     <m:oMath xmlns:m="http://schemas.openxmlformats.org/officeDocument/2006/math">
-                      <a:fld id="{63A3532D-EDA9-3842-977A-61D20FA072C5}" type="mathplaceholder">
+                      <a:fld id="{825F15A7-03F4-43D7-82C5-3E23DA2F108C}" type="mathplaceholder">
                         <a:rPr lang="en-US" i="1" smtClean="0">
                           <a:latin typeface="Cambria Math" panose="02040503050406030204" pitchFamily="18" charset="0"/>
                         </a:rPr>
@@ -2543,6 +2544,45 @@
             <a:r>
               <a:rPr lang="en-US" dirty="0"/>
               <a:t>1</a:t>
+            </a:r>
+          </a:p>
+        </p:txBody>
+      </p:sp>
+      <p:sp>
+        <p:nvSpPr>
+          <p:cNvPr id="5" name="TextBox 4">
+            <a:extLst>
+              <a:ext uri="{FF2B5EF4-FFF2-40B4-BE49-F238E27FC236}">
+                <a16:creationId xmlns:a16="http://schemas.microsoft.com/office/drawing/2014/main" id="{E2B90460-CF1E-184D-A80C-FB79CDE578DC}"/>
+              </a:ext>
+            </a:extLst>
+          </p:cNvPr>
+          <p:cNvSpPr txBox="1"/>
+          <p:nvPr/>
+        </p:nvSpPr>
+        <p:spPr>
+          <a:xfrm>
+            <a:off x="8462357" y="3289465"/>
+            <a:ext cx="2225435" cy="276999"/>
+          </a:xfrm>
+          <a:prstGeom prst="rect">
+            <a:avLst/>
+          </a:prstGeom>
+          <a:noFill/>
+        </p:spPr>
+        <p:txBody>
+          <a:bodyPr wrap="square" rtlCol="0">
+            <a:spAutoFit/>
+          </a:bodyPr>
+          <a:lstStyle/>
+          <a:p>
+            <a:r>
+              <a:rPr lang="en-US" sz="1200" dirty="0">
+                <a:solidFill>
+                  <a:srgbClr val="FF0000"/>
+                </a:solidFill>
+              </a:rPr>
+              <a:t>2021.10.9 Jiawei Wang</a:t>
             </a:r>
           </a:p>
         </p:txBody>
@@ -4420,7 +4460,26 @@
                   </a:schemeClr>
                 </a:solidFill>
               </a:rPr>
-              <a:t>Show finite automata equivalent to regular expressions</a:t>
+              <a:t>Show finite automata </a:t>
+            </a:r>
+            <a:r>
+              <a:rPr lang="en-US" sz="3200" dirty="0">
+                <a:solidFill>
+                  <a:srgbClr val="FF0000"/>
+                </a:solidFill>
+              </a:rPr>
+              <a:t>equivalent</a:t>
+            </a:r>
+            <a:r>
+              <a:rPr lang="en-US" sz="3200" dirty="0">
+                <a:solidFill>
+                  <a:schemeClr val="accent1">
+                    <a:lumMod val="60000"/>
+                    <a:lumOff val="40000"/>
+                  </a:schemeClr>
+                </a:solidFill>
+              </a:rPr>
+              <a:t> to regular expressions</a:t>
             </a:r>
             <a:endParaRPr lang="en-US" sz="3600" dirty="0">
               <a:solidFill>
@@ -13472,8 +13531,8 @@
         </p:nvGrpSpPr>
         <p:grpSpPr>
           <a:xfrm>
-            <a:off x="217840" y="3192391"/>
-            <a:ext cx="7791104" cy="3665609"/>
+            <a:off x="281165" y="3264175"/>
+            <a:ext cx="7507894" cy="3546171"/>
             <a:chOff x="20676" y="3192391"/>
             <a:chExt cx="7791104" cy="3665609"/>
           </a:xfrm>
@@ -14227,6 +14286,133 @@
               <a:rPr lang="en-US" dirty="0"/>
               <a:t>11</a:t>
             </a:r>
+          </a:p>
+        </p:txBody>
+      </p:sp>
+      <p:cxnSp>
+        <p:nvCxnSpPr>
+          <p:cNvPr id="32" name="Straight Connector 31">
+            <a:extLst>
+              <a:ext uri="{FF2B5EF4-FFF2-40B4-BE49-F238E27FC236}">
+                <a16:creationId xmlns:a16="http://schemas.microsoft.com/office/drawing/2014/main" id="{97364B58-7E50-C945-B088-B9DA03C504F0}"/>
+              </a:ext>
+            </a:extLst>
+          </p:cNvPr>
+          <p:cNvCxnSpPr/>
+          <p:nvPr/>
+        </p:nvCxnSpPr>
+        <p:spPr>
+          <a:xfrm>
+            <a:off x="2375634" y="6049495"/>
+            <a:ext cx="161675" cy="151303"/>
+          </a:xfrm>
+          <a:prstGeom prst="line">
+            <a:avLst/>
+          </a:prstGeom>
+          <a:ln w="9525">
+            <a:solidFill>
+              <a:srgbClr val="FF0000"/>
+            </a:solidFill>
+            <a:tailEnd type="none"/>
+          </a:ln>
+        </p:spPr>
+        <p:style>
+          <a:lnRef idx="1">
+            <a:schemeClr val="accent1"/>
+          </a:lnRef>
+          <a:fillRef idx="0">
+            <a:schemeClr val="accent1"/>
+          </a:fillRef>
+          <a:effectRef idx="0">
+            <a:schemeClr val="accent1"/>
+          </a:effectRef>
+          <a:fontRef idx="minor">
+            <a:schemeClr val="tx1"/>
+          </a:fontRef>
+        </p:style>
+      </p:cxnSp>
+      <p:cxnSp>
+        <p:nvCxnSpPr>
+          <p:cNvPr id="38" name="Straight Connector 37">
+            <a:extLst>
+              <a:ext uri="{FF2B5EF4-FFF2-40B4-BE49-F238E27FC236}">
+                <a16:creationId xmlns:a16="http://schemas.microsoft.com/office/drawing/2014/main" id="{D5AC5C71-E94D-954C-B6AB-E1FDA49D44EB}"/>
+              </a:ext>
+            </a:extLst>
+          </p:cNvPr>
+          <p:cNvCxnSpPr/>
+          <p:nvPr/>
+        </p:nvCxnSpPr>
+        <p:spPr>
+          <a:xfrm flipV="1">
+            <a:off x="2537309" y="5897095"/>
+            <a:ext cx="495190" cy="303703"/>
+          </a:xfrm>
+          <a:prstGeom prst="line">
+            <a:avLst/>
+          </a:prstGeom>
+          <a:ln w="9525">
+            <a:solidFill>
+              <a:srgbClr val="FF0000"/>
+            </a:solidFill>
+            <a:tailEnd type="none"/>
+          </a:ln>
+        </p:spPr>
+        <p:style>
+          <a:lnRef idx="1">
+            <a:schemeClr val="accent1"/>
+          </a:lnRef>
+          <a:fillRef idx="0">
+            <a:schemeClr val="accent1"/>
+          </a:fillRef>
+          <a:effectRef idx="0">
+            <a:schemeClr val="accent1"/>
+          </a:effectRef>
+          <a:fontRef idx="minor">
+            <a:schemeClr val="tx1"/>
+          </a:fontRef>
+        </p:style>
+      </p:cxnSp>
+      <p:sp>
+        <p:nvSpPr>
+          <p:cNvPr id="52" name="TextBox 51">
+            <a:extLst>
+              <a:ext uri="{FF2B5EF4-FFF2-40B4-BE49-F238E27FC236}">
+                <a16:creationId xmlns:a16="http://schemas.microsoft.com/office/drawing/2014/main" id="{EBFF58B1-D3D0-104D-9AA6-013BDA67E172}"/>
+              </a:ext>
+            </a:extLst>
+          </p:cNvPr>
+          <p:cNvSpPr txBox="1"/>
+          <p:nvPr/>
+        </p:nvSpPr>
+        <p:spPr>
+          <a:xfrm>
+            <a:off x="7789059" y="6432309"/>
+            <a:ext cx="3118608" cy="646331"/>
+          </a:xfrm>
+          <a:prstGeom prst="rect">
+            <a:avLst/>
+          </a:prstGeom>
+          <a:noFill/>
+        </p:spPr>
+        <p:txBody>
+          <a:bodyPr wrap="square" rtlCol="0">
+            <a:spAutoFit/>
+          </a:bodyPr>
+          <a:lstStyle/>
+          <a:p>
+            <a:r>
+              <a:rPr lang="en-HK" dirty="0">
+                <a:solidFill>
+                  <a:srgbClr val="FF0000"/>
+                </a:solidFill>
+              </a:rPr>
+              <a:t>F ={(r1,r2)|r1 ∈ F1 or r2 ∈ F2}.</a:t>
+            </a:r>
+            <a:br>
+              <a:rPr lang="en-HK" dirty="0"/>
+            </a:br>
+            <a:endParaRPr lang="en-HK" dirty="0"/>
           </a:p>
         </p:txBody>
       </p:sp>
@@ -15328,6 +15514,80 @@
 </file>
 
 <file path=ppt/slides/slide12.xml><?xml version="1.0" encoding="utf-8"?>
+<p:sld xmlns:a="http://schemas.openxmlformats.org/drawingml/2006/main" xmlns:r="http://schemas.openxmlformats.org/officeDocument/2006/relationships" xmlns:p="http://schemas.openxmlformats.org/presentationml/2006/main">
+  <p:cSld>
+    <p:bg>
+      <p:bgPr>
+        <a:solidFill>
+          <a:schemeClr val="bg1"/>
+        </a:solidFill>
+        <a:effectLst/>
+      </p:bgPr>
+    </p:bg>
+    <p:spTree>
+      <p:nvGrpSpPr>
+        <p:cNvPr id="1" name=""/>
+        <p:cNvGrpSpPr/>
+        <p:nvPr/>
+      </p:nvGrpSpPr>
+      <p:grpSpPr>
+        <a:xfrm>
+          <a:off x="0" y="0"/>
+          <a:ext cx="0" cy="0"/>
+          <a:chOff x="0" y="0"/>
+          <a:chExt cx="0" cy="0"/>
+        </a:xfrm>
+      </p:grpSpPr>
+      <p:pic>
+        <p:nvPicPr>
+          <p:cNvPr id="2" name="Picture 1" descr="A picture containing shape&#10;&#10;Description automatically generated">
+            <a:extLst>
+              <a:ext uri="{FF2B5EF4-FFF2-40B4-BE49-F238E27FC236}">
+                <a16:creationId xmlns:a16="http://schemas.microsoft.com/office/drawing/2014/main" id="{BD9F7C06-9917-6A40-9784-B6E5E7CFDE94}"/>
+              </a:ext>
+            </a:extLst>
+          </p:cNvPr>
+          <p:cNvPicPr>
+            <a:picLocks noChangeAspect="1"/>
+          </p:cNvPicPr>
+          <p:nvPr/>
+        </p:nvPicPr>
+        <p:blipFill>
+          <a:blip r:embed="rId2">
+            <a:extLst>
+              <a:ext uri="{28A0092B-C50C-407E-A947-70E740481C1C}">
+                <a14:useLocalDpi xmlns:a14="http://schemas.microsoft.com/office/drawing/2010/main" val="0"/>
+              </a:ext>
+            </a:extLst>
+          </a:blip>
+          <a:stretch>
+            <a:fillRect/>
+          </a:stretch>
+        </p:blipFill>
+        <p:spPr>
+          <a:xfrm>
+            <a:off x="643467" y="1970447"/>
+            <a:ext cx="10905066" cy="2917104"/>
+          </a:xfrm>
+          <a:prstGeom prst="rect">
+            <a:avLst/>
+          </a:prstGeom>
+        </p:spPr>
+      </p:pic>
+    </p:spTree>
+    <p:extLst>
+      <p:ext uri="{BB962C8B-B14F-4D97-AF65-F5344CB8AC3E}">
+        <p14:creationId xmlns:p14="http://schemas.microsoft.com/office/powerpoint/2010/main" val="2380617011"/>
+      </p:ext>
+    </p:extLst>
+  </p:cSld>
+  <p:clrMapOvr>
+    <a:masterClrMapping/>
+  </p:clrMapOvr>
+</p:sld>
+</file>
+
+<file path=ppt/slides/slide13.xml><?xml version="1.0" encoding="utf-8"?>
 <p:sld xmlns:a="http://schemas.openxmlformats.org/drawingml/2006/main" xmlns:r="http://schemas.openxmlformats.org/officeDocument/2006/relationships" xmlns:p="http://schemas.openxmlformats.org/presentationml/2006/main">
   <p:cSld>
     <p:spTree>
@@ -22986,6 +23246,45 @@
           </a:p>
         </p:txBody>
       </p:sp>
+      <p:sp>
+        <p:nvSpPr>
+          <p:cNvPr id="9" name="TextBox 8">
+            <a:extLst>
+              <a:ext uri="{FF2B5EF4-FFF2-40B4-BE49-F238E27FC236}">
+                <a16:creationId xmlns:a16="http://schemas.microsoft.com/office/drawing/2014/main" id="{D324C923-D975-9C4E-A1B9-B241BCC6B552}"/>
+              </a:ext>
+            </a:extLst>
+          </p:cNvPr>
+          <p:cNvSpPr txBox="1"/>
+          <p:nvPr/>
+        </p:nvSpPr>
+        <p:spPr>
+          <a:xfrm>
+            <a:off x="7911095" y="3922163"/>
+            <a:ext cx="2652043" cy="307777"/>
+          </a:xfrm>
+          <a:prstGeom prst="rect">
+            <a:avLst/>
+          </a:prstGeom>
+          <a:noFill/>
+        </p:spPr>
+        <p:txBody>
+          <a:bodyPr wrap="square" rtlCol="0">
+            <a:spAutoFit/>
+          </a:bodyPr>
+          <a:lstStyle/>
+          <a:p>
+            <a:r>
+              <a:rPr lang="en-US" sz="1400" dirty="0">
+                <a:solidFill>
+                  <a:srgbClr val="FF0000"/>
+                </a:solidFill>
+              </a:rPr>
+              <a:t>Connect M1 and M2</a:t>
+            </a:r>
+          </a:p>
+        </p:txBody>
+      </p:sp>
     </p:spTree>
     <p:extLst>
       <p:ext uri="{BB962C8B-B14F-4D97-AF65-F5344CB8AC3E}">
@@ -24297,7 +24596,7 @@
 </p:sld>
 </file>
 
-<file path=ppt/slides/slide13.xml><?xml version="1.0" encoding="utf-8"?>
+<file path=ppt/slides/slide14.xml><?xml version="1.0" encoding="utf-8"?>
 <p:sld xmlns:a="http://schemas.openxmlformats.org/drawingml/2006/main" xmlns:r="http://schemas.openxmlformats.org/officeDocument/2006/relationships" xmlns:p="http://schemas.openxmlformats.org/presentationml/2006/main">
   <p:cSld>
     <p:spTree>
@@ -24916,7 +25215,7 @@
 </p:sld>
 </file>
 
-<file path=ppt/slides/slide14.xml><?xml version="1.0" encoding="utf-8"?>
+<file path=ppt/slides/slide15.xml><?xml version="1.0" encoding="utf-8"?>
 <p:sld xmlns:a="http://schemas.openxmlformats.org/drawingml/2006/main" xmlns:r="http://schemas.openxmlformats.org/officeDocument/2006/relationships" xmlns:p="http://schemas.openxmlformats.org/presentationml/2006/main">
   <p:cSld>
     <p:spTree>
@@ -28799,7 +29098,7 @@
             <a:lstStyle/>
             <a:p>
               <a:pPr algn="ctr"/>
-              <a:endParaRPr lang="en-US"/>
+              <a:endParaRPr lang="en-US" dirty="0"/>
             </a:p>
           </p:txBody>
         </p:sp>
@@ -30683,6 +30982,123 @@
           </a:p>
         </p:txBody>
       </p:sp>
+      <p:sp>
+        <p:nvSpPr>
+          <p:cNvPr id="13" name="TextBox 12">
+            <a:extLst>
+              <a:ext uri="{FF2B5EF4-FFF2-40B4-BE49-F238E27FC236}">
+                <a16:creationId xmlns:a16="http://schemas.microsoft.com/office/drawing/2014/main" id="{B2E2F61B-3880-234F-ABDC-6461C6C4EABF}"/>
+              </a:ext>
+            </a:extLst>
+          </p:cNvPr>
+          <p:cNvSpPr txBox="1"/>
+          <p:nvPr/>
+        </p:nvSpPr>
+        <p:spPr>
+          <a:xfrm>
+            <a:off x="6282056" y="779105"/>
+            <a:ext cx="2928258" cy="738664"/>
+          </a:xfrm>
+          <a:prstGeom prst="rect">
+            <a:avLst/>
+          </a:prstGeom>
+          <a:noFill/>
+        </p:spPr>
+        <p:txBody>
+          <a:bodyPr wrap="square" rtlCol="0">
+            <a:spAutoFit/>
+          </a:bodyPr>
+          <a:lstStyle/>
+          <a:p>
+            <a:r>
+              <a:rPr lang="en-US" sz="1400" dirty="0">
+                <a:solidFill>
+                  <a:srgbClr val="FF0000"/>
+                </a:solidFill>
+              </a:rPr>
+              <a:t>You can think of it as representing a computer that has a very limited and small amount of memory</a:t>
+            </a:r>
+          </a:p>
+        </p:txBody>
+      </p:sp>
+      <p:sp>
+        <p:nvSpPr>
+          <p:cNvPr id="15" name="TextBox 14">
+            <a:extLst>
+              <a:ext uri="{FF2B5EF4-FFF2-40B4-BE49-F238E27FC236}">
+                <a16:creationId xmlns:a16="http://schemas.microsoft.com/office/drawing/2014/main" id="{6A5C3266-5D32-044D-B77E-E5D417C522F5}"/>
+              </a:ext>
+            </a:extLst>
+          </p:cNvPr>
+          <p:cNvSpPr txBox="1"/>
+          <p:nvPr/>
+        </p:nvSpPr>
+        <p:spPr>
+          <a:xfrm>
+            <a:off x="8348209" y="4709438"/>
+            <a:ext cx="2538494" cy="307777"/>
+          </a:xfrm>
+          <a:prstGeom prst="rect">
+            <a:avLst/>
+          </a:prstGeom>
+          <a:noFill/>
+        </p:spPr>
+        <p:txBody>
+          <a:bodyPr wrap="square" rtlCol="0">
+            <a:spAutoFit/>
+          </a:bodyPr>
+          <a:lstStyle/>
+          <a:p>
+            <a:r>
+              <a:rPr lang="en-US" sz="1400" dirty="0">
+                <a:solidFill>
+                  <a:srgbClr val="FF0000"/>
+                </a:solidFill>
+              </a:rPr>
+              <a:t>M1-&gt;Collection of these strings</a:t>
+            </a:r>
+          </a:p>
+        </p:txBody>
+      </p:sp>
+      <p:sp>
+        <p:nvSpPr>
+          <p:cNvPr id="18" name="TextBox 17">
+            <a:extLst>
+              <a:ext uri="{FF2B5EF4-FFF2-40B4-BE49-F238E27FC236}">
+                <a16:creationId xmlns:a16="http://schemas.microsoft.com/office/drawing/2014/main" id="{9C505E08-A4CD-3340-83D3-DFAAF511467F}"/>
+              </a:ext>
+            </a:extLst>
+          </p:cNvPr>
+          <p:cNvSpPr txBox="1"/>
+          <p:nvPr/>
+        </p:nvSpPr>
+        <p:spPr>
+          <a:xfrm>
+            <a:off x="6282056" y="6472989"/>
+            <a:ext cx="3980881" cy="307777"/>
+          </a:xfrm>
+          <a:prstGeom prst="rect">
+            <a:avLst/>
+          </a:prstGeom>
+          <a:noFill/>
+        </p:spPr>
+        <p:txBody>
+          <a:bodyPr wrap="square" rtlCol="0">
+            <a:spAutoFit/>
+          </a:bodyPr>
+          <a:lstStyle/>
+          <a:p>
+            <a:r>
+              <a:rPr lang="en-US" sz="1400" dirty="0">
+                <a:solidFill>
+                  <a:srgbClr val="FF0000"/>
+                </a:solidFill>
+              </a:rPr>
+              <a:t>3 –same-way of saying the same thing </a:t>
+            </a:r>
+          </a:p>
+        </p:txBody>
+      </p:sp>
     </p:spTree>
     <p:extLst>
       <p:ext uri="{BB962C8B-B14F-4D97-AF65-F5344CB8AC3E}">
@@ -31439,8 +31855,8 @@
           </a:p>
         </p:txBody>
       </p:sp>
-      <mc:AlternateContent xmlns:mc="http://schemas.openxmlformats.org/markup-compatibility/2006" xmlns:a14="http://schemas.microsoft.com/office/drawing/2010/main">
-        <mc:Choice Requires="a14">
+      <mc:AlternateContent xmlns:mc="http://schemas.openxmlformats.org/markup-compatibility/2006">
+        <mc:Choice xmlns:a14="http://schemas.microsoft.com/office/drawing/2010/main" Requires="a14">
           <p:sp>
             <p:nvSpPr>
               <p:cNvPr id="3" name="TextBox 2"/>
@@ -31742,8 +32158,17 @@
                 </a14:m>
                 <a:r>
                   <a:rPr lang="en-US" sz="2000" dirty="0"/>
-                  <a:t>   start state</a:t>
+                  <a:t>   start state </a:t>
                 </a:r>
+                <a:r>
+                  <a:rPr lang="en-US" sz="1200" dirty="0">
+                    <a:solidFill>
+                      <a:srgbClr val="FF0000"/>
+                    </a:solidFill>
+                  </a:rPr>
+                  <a:t>(only one)</a:t>
+                </a:r>
+                <a:endParaRPr lang="en-US" sz="1200" dirty="0"/>
               </a:p>
               <a:p>
                 <a:pPr>
@@ -31781,7 +32206,7 @@
             </p:txBody>
           </p:sp>
         </mc:Choice>
-        <mc:Fallback xmlns="">
+        <mc:Fallback>
           <p:sp>
             <p:nvSpPr>
               <p:cNvPr id="3" name="TextBox 2"/>
@@ -31801,7 +32226,7 @@
               <a:blipFill>
                 <a:blip r:embed="rId3"/>
                 <a:stretch>
-                  <a:fillRect l="-1388" t="-1758" b="-2857"/>
+                  <a:fillRect l="-1261" t="-1370" b="-3196"/>
                 </a:stretch>
               </a:blipFill>
             </p:spPr>
@@ -35087,6 +35512,45 @@
           </a:p>
         </p:txBody>
       </p:sp>
+      <p:sp>
+        <p:nvSpPr>
+          <p:cNvPr id="38" name="TextBox 37">
+            <a:extLst>
+              <a:ext uri="{FF2B5EF4-FFF2-40B4-BE49-F238E27FC236}">
+                <a16:creationId xmlns:a16="http://schemas.microsoft.com/office/drawing/2014/main" id="{B442CD6B-6505-B44E-B194-02A93FA195DC}"/>
+              </a:ext>
+            </a:extLst>
+          </p:cNvPr>
+          <p:cNvSpPr txBox="1"/>
+          <p:nvPr/>
+        </p:nvSpPr>
+        <p:spPr>
+          <a:xfrm>
+            <a:off x="851334" y="567087"/>
+            <a:ext cx="10736180" cy="1077218"/>
+          </a:xfrm>
+          <a:prstGeom prst="rect">
+            <a:avLst/>
+          </a:prstGeom>
+          <a:noFill/>
+        </p:spPr>
+        <p:txBody>
+          <a:bodyPr wrap="square" rtlCol="0">
+            <a:spAutoFit/>
+          </a:bodyPr>
+          <a:lstStyle/>
+          <a:p>
+            <a:r>
+              <a:rPr lang="en-US" sz="1600" dirty="0">
+                <a:solidFill>
+                  <a:srgbClr val="FF0000"/>
+                </a:solidFill>
+              </a:rPr>
+              <a:t>The reason for having a formal definition is, for one thing, it allows us to be very precise, then we’ll know exactly what we mean by a finite automaton and then we’ll know exactly what we mean by a finite automaton and should answer any question about what counts and what doesn’t count. Another reason is that we can use its formal notation rather than as a kind of a picture when we want to represents them in formal articles.</a:t>
+            </a:r>
+          </a:p>
+        </p:txBody>
+      </p:sp>
     </p:spTree>
     <p:extLst>
       <p:ext uri="{BB962C8B-B14F-4D97-AF65-F5344CB8AC3E}">
@@ -36644,8 +37108,8 @@
           </p:sp>
         </mc:Fallback>
       </mc:AlternateContent>
-      <mc:AlternateContent xmlns:mc="http://schemas.openxmlformats.org/markup-compatibility/2006" xmlns:a14="http://schemas.microsoft.com/office/drawing/2010/main">
-        <mc:Choice Requires="a14">
+      <mc:AlternateContent xmlns:mc="http://schemas.openxmlformats.org/markup-compatibility/2006">
+        <mc:Choice xmlns:a14="http://schemas.microsoft.com/office/drawing/2010/main" Requires="a14">
           <p:sp>
             <p:nvSpPr>
               <p:cNvPr id="4" name="TextBox 3"/>
@@ -36950,10 +37414,7 @@
                 <a:r>
                   <a:rPr lang="en-US" sz="2400" u="sng" dirty="0">
                     <a:solidFill>
-                      <a:schemeClr val="accent1">
-                        <a:lumMod val="60000"/>
-                        <a:lumOff val="40000"/>
-                      </a:schemeClr>
+                      <a:srgbClr val="FF0000"/>
                     </a:solidFill>
                   </a:rPr>
                   <a:t>regular</a:t>
@@ -36997,7 +37458,7 @@
             </p:txBody>
           </p:sp>
         </mc:Choice>
-        <mc:Fallback xmlns="">
+        <mc:Fallback>
           <p:sp>
             <p:nvSpPr>
               <p:cNvPr id="4" name="TextBox 3"/>
@@ -37017,7 +37478,7 @@
               <a:blipFill>
                 <a:blip r:embed="rId4"/>
                 <a:stretch>
-                  <a:fillRect l="-2000" t="-1434" r="-3200"/>
+                  <a:fillRect l="-1939" t="-1487" r="-3324"/>
                 </a:stretch>
               </a:blipFill>
             </p:spPr>
@@ -37071,6 +37532,103 @@
           </a:p>
         </p:txBody>
       </p:sp>
+      <p:sp>
+        <p:nvSpPr>
+          <p:cNvPr id="6" name="TextBox 5">
+            <a:extLst>
+              <a:ext uri="{FF2B5EF4-FFF2-40B4-BE49-F238E27FC236}">
+                <a16:creationId xmlns:a16="http://schemas.microsoft.com/office/drawing/2014/main" id="{F3602592-2660-9E4E-89A6-E10D1137AA74}"/>
+              </a:ext>
+            </a:extLst>
+          </p:cNvPr>
+          <p:cNvSpPr txBox="1"/>
+          <p:nvPr/>
+        </p:nvSpPr>
+        <p:spPr>
+          <a:xfrm>
+            <a:off x="2911642" y="5955633"/>
+            <a:ext cx="3184358" cy="523220"/>
+          </a:xfrm>
+          <a:prstGeom prst="rect">
+            <a:avLst/>
+          </a:prstGeom>
+          <a:noFill/>
+        </p:spPr>
+        <p:txBody>
+          <a:bodyPr wrap="square" rtlCol="0">
+            <a:spAutoFit/>
+          </a:bodyPr>
+          <a:lstStyle/>
+          <a:p>
+            <a:r>
+              <a:rPr lang="en-US" sz="1400" dirty="0">
+                <a:solidFill>
+                  <a:srgbClr val="FF0000"/>
+                </a:solidFill>
+              </a:rPr>
+              <a:t>The I-</a:t>
+            </a:r>
+            <a:r>
+              <a:rPr lang="en-US" sz="1400" dirty="0" err="1">
+                <a:solidFill>
+                  <a:srgbClr val="FF0000"/>
+                </a:solidFill>
+              </a:rPr>
+              <a:t>th</a:t>
+            </a:r>
+            <a:r>
+              <a:rPr lang="en-US" sz="1400" dirty="0">
+                <a:solidFill>
+                  <a:srgbClr val="FF0000"/>
+                </a:solidFill>
+              </a:rPr>
+              <a:t> member of the sequence is obtained by looking at the previous one</a:t>
+            </a:r>
+          </a:p>
+        </p:txBody>
+      </p:sp>
+      <p:cxnSp>
+        <p:nvCxnSpPr>
+          <p:cNvPr id="8" name="Straight Arrow Connector 7">
+            <a:extLst>
+              <a:ext uri="{FF2B5EF4-FFF2-40B4-BE49-F238E27FC236}">
+                <a16:creationId xmlns:a16="http://schemas.microsoft.com/office/drawing/2014/main" id="{7814EEE0-42B9-A24E-A2C1-BEC47E3A8D29}"/>
+              </a:ext>
+            </a:extLst>
+          </p:cNvPr>
+          <p:cNvCxnSpPr/>
+          <p:nvPr/>
+        </p:nvCxnSpPr>
+        <p:spPr>
+          <a:xfrm>
+            <a:off x="2322095" y="5955632"/>
+            <a:ext cx="553452" cy="252663"/>
+          </a:xfrm>
+          <a:prstGeom prst="straightConnector1">
+            <a:avLst/>
+          </a:prstGeom>
+          <a:ln w="9525">
+            <a:solidFill>
+              <a:srgbClr val="FF0000"/>
+            </a:solidFill>
+            <a:tailEnd type="triangle"/>
+          </a:ln>
+        </p:spPr>
+        <p:style>
+          <a:lnRef idx="1">
+            <a:schemeClr val="accent1"/>
+          </a:lnRef>
+          <a:fillRef idx="0">
+            <a:schemeClr val="accent1"/>
+          </a:fillRef>
+          <a:effectRef idx="0">
+            <a:schemeClr val="accent1"/>
+          </a:effectRef>
+          <a:fontRef idx="minor">
+            <a:schemeClr val="tx1"/>
+          </a:fontRef>
+        </p:style>
+      </p:cxnSp>
     </p:spTree>
     <p:extLst>
       <p:ext uri="{BB962C8B-B14F-4D97-AF65-F5344CB8AC3E}">
@@ -40427,14 +40985,6 @@
 </file>
 
 <file path=customXml/item1.xml><?xml version="1.0" encoding="utf-8"?>
-<p:properties xmlns:p="http://schemas.microsoft.com/office/2006/metadata/properties" xmlns:xsi="http://www.w3.org/2001/XMLSchema-instance" xmlns:pc="http://schemas.microsoft.com/office/infopath/2007/PartnerControls">
-  <documentManagement>
-    <DateCreated xmlns="ce0de229-b968-460b-bfa6-c309bf067a33" xsi:nil="true"/>
-  </documentManagement>
-</p:properties>
-</file>
-
-<file path=customXml/item2.xml><?xml version="1.0" encoding="utf-8"?>
 <ct:contentTypeSchema xmlns:ct="http://schemas.microsoft.com/office/2006/metadata/contentType" xmlns:ma="http://schemas.microsoft.com/office/2006/metadata/properties/metaAttributes" ct:_="" ma:_="" ma:contentTypeName="Document" ma:contentTypeID="0x0101001F4D1872214E7E4AA66A0644C9DCCEFF" ma:contentTypeVersion="13" ma:contentTypeDescription="Create a new document." ma:contentTypeScope="" ma:versionID="a7594662c8e5fc21752806ac3520e701">
   <xsd:schema xmlns:xsd="http://www.w3.org/2001/XMLSchema" xmlns:xs="http://www.w3.org/2001/XMLSchema" xmlns:p="http://schemas.microsoft.com/office/2006/metadata/properties" xmlns:ns2="ce0de229-b968-460b-bfa6-c309bf067a33" xmlns:ns3="b2272a47-6a34-441e-975c-341e732a1f8b" targetNamespace="http://schemas.microsoft.com/office/2006/metadata/properties" ma:root="true" ma:fieldsID="90f7ced8e6f78dd6fdf52a8c3b233a3b" ns2:_="" ns3:_="">
     <xsd:import namespace="ce0de229-b968-460b-bfa6-c309bf067a33"/>
@@ -40657,6 +41207,14 @@
 </ct:contentTypeSchema>
 </file>
 
+<file path=customXml/item2.xml><?xml version="1.0" encoding="utf-8"?>
+<p:properties xmlns:p="http://schemas.microsoft.com/office/2006/metadata/properties" xmlns:xsi="http://www.w3.org/2001/XMLSchema-instance" xmlns:pc="http://schemas.microsoft.com/office/infopath/2007/PartnerControls">
+  <documentManagement>
+    <DateCreated xmlns="ce0de229-b968-460b-bfa6-c309bf067a33" xsi:nil="true"/>
+  </documentManagement>
+</p:properties>
+</file>
+
 <file path=customXml/item3.xml><?xml version="1.0" encoding="utf-8"?>
 <?mso-contentType ?>
 <FormTemplates xmlns="http://schemas.microsoft.com/sharepoint/v3/contenttype/forms">
@@ -40667,16 +41225,6 @@
 </file>
 
 <file path=customXml/itemProps1.xml><?xml version="1.0" encoding="utf-8"?>
-<ds:datastoreItem xmlns:ds="http://schemas.openxmlformats.org/officeDocument/2006/customXml" ds:itemID="{F5827AEE-1E88-4118-A9AF-59056AEEC4EA}">
-  <ds:schemaRefs>
-    <ds:schemaRef ds:uri="http://schemas.microsoft.com/office/2006/metadata/properties"/>
-    <ds:schemaRef ds:uri="http://schemas.microsoft.com/office/infopath/2007/PartnerControls"/>
-    <ds:schemaRef ds:uri="ce0de229-b968-460b-bfa6-c309bf067a33"/>
-  </ds:schemaRefs>
-</ds:datastoreItem>
-</file>
-
-<file path=customXml/itemProps2.xml><?xml version="1.0" encoding="utf-8"?>
 <ds:datastoreItem xmlns:ds="http://schemas.openxmlformats.org/officeDocument/2006/customXml" ds:itemID="{93C24BE7-6E49-4E0A-81E6-18D0DD6C59DE}">
   <ds:schemaRefs>
     <ds:schemaRef ds:uri="http://schemas.microsoft.com/office/2006/metadata/contentType"/>
@@ -40695,6 +41243,16 @@
 </ds:datastoreItem>
 </file>
 
+<file path=customXml/itemProps2.xml><?xml version="1.0" encoding="utf-8"?>
+<ds:datastoreItem xmlns:ds="http://schemas.openxmlformats.org/officeDocument/2006/customXml" ds:itemID="{F5827AEE-1E88-4118-A9AF-59056AEEC4EA}">
+  <ds:schemaRefs>
+    <ds:schemaRef ds:uri="http://schemas.microsoft.com/office/2006/metadata/properties"/>
+    <ds:schemaRef ds:uri="http://schemas.microsoft.com/office/infopath/2007/PartnerControls"/>
+    <ds:schemaRef ds:uri="ce0de229-b968-460b-bfa6-c309bf067a33"/>
+  </ds:schemaRefs>
+</ds:datastoreItem>
+</file>
+
 <file path=customXml/itemProps3.xml><?xml version="1.0" encoding="utf-8"?>
 <ds:datastoreItem xmlns:ds="http://schemas.openxmlformats.org/officeDocument/2006/customXml" ds:itemID="{A98B59C4-A0FC-4CA5-888B-AA281E10279E}">
   <ds:schemaRefs>

</xml_diff>